<commit_message>
Fix a bug in Terrain::init()
- add setModified().
</commit_message>
<xml_diff>
--- a/doc/results/weird/figures/AdaptiveFitting.pptx
+++ b/doc/results/weird/figures/AdaptiveFitting.pptx
@@ -289,7 +289,7 @@
             <a:fld id="{1D8BD707-D9CF-40AE-B4C6-C98DA3205C09}" type="datetimeFigureOut">
               <a:rPr lang="en-US" smtClean="0"/>
               <a:pPr/>
-              <a:t>4/5/2014</a:t>
+              <a:t>4/17/2014</a:t>
             </a:fld>
             <a:endParaRPr lang="en-US"/>
           </a:p>
@@ -456,7 +456,7 @@
             <a:fld id="{1D8BD707-D9CF-40AE-B4C6-C98DA3205C09}" type="datetimeFigureOut">
               <a:rPr lang="en-US" smtClean="0"/>
               <a:pPr/>
-              <a:t>4/5/2014</a:t>
+              <a:t>4/17/2014</a:t>
             </a:fld>
             <a:endParaRPr lang="en-US"/>
           </a:p>
@@ -633,7 +633,7 @@
             <a:fld id="{1D8BD707-D9CF-40AE-B4C6-C98DA3205C09}" type="datetimeFigureOut">
               <a:rPr lang="en-US" smtClean="0"/>
               <a:pPr/>
-              <a:t>4/5/2014</a:t>
+              <a:t>4/17/2014</a:t>
             </a:fld>
             <a:endParaRPr lang="en-US"/>
           </a:p>
@@ -800,7 +800,7 @@
             <a:fld id="{1D8BD707-D9CF-40AE-B4C6-C98DA3205C09}" type="datetimeFigureOut">
               <a:rPr lang="en-US" smtClean="0"/>
               <a:pPr/>
-              <a:t>4/5/2014</a:t>
+              <a:t>4/17/2014</a:t>
             </a:fld>
             <a:endParaRPr lang="en-US"/>
           </a:p>
@@ -1043,7 +1043,7 @@
             <a:fld id="{1D8BD707-D9CF-40AE-B4C6-C98DA3205C09}" type="datetimeFigureOut">
               <a:rPr lang="en-US" smtClean="0"/>
               <a:pPr/>
-              <a:t>4/5/2014</a:t>
+              <a:t>4/17/2014</a:t>
             </a:fld>
             <a:endParaRPr lang="en-US"/>
           </a:p>
@@ -1328,7 +1328,7 @@
             <a:fld id="{1D8BD707-D9CF-40AE-B4C6-C98DA3205C09}" type="datetimeFigureOut">
               <a:rPr lang="en-US" smtClean="0"/>
               <a:pPr/>
-              <a:t>4/5/2014</a:t>
+              <a:t>4/17/2014</a:t>
             </a:fld>
             <a:endParaRPr lang="en-US"/>
           </a:p>
@@ -1747,7 +1747,7 @@
             <a:fld id="{1D8BD707-D9CF-40AE-B4C6-C98DA3205C09}" type="datetimeFigureOut">
               <a:rPr lang="en-US" smtClean="0"/>
               <a:pPr/>
-              <a:t>4/5/2014</a:t>
+              <a:t>4/17/2014</a:t>
             </a:fld>
             <a:endParaRPr lang="en-US"/>
           </a:p>
@@ -1862,7 +1862,7 @@
             <a:fld id="{1D8BD707-D9CF-40AE-B4C6-C98DA3205C09}" type="datetimeFigureOut">
               <a:rPr lang="en-US" smtClean="0"/>
               <a:pPr/>
-              <a:t>4/5/2014</a:t>
+              <a:t>4/17/2014</a:t>
             </a:fld>
             <a:endParaRPr lang="en-US"/>
           </a:p>
@@ -1954,7 +1954,7 @@
             <a:fld id="{1D8BD707-D9CF-40AE-B4C6-C98DA3205C09}" type="datetimeFigureOut">
               <a:rPr lang="en-US" smtClean="0"/>
               <a:pPr/>
-              <a:t>4/5/2014</a:t>
+              <a:t>4/17/2014</a:t>
             </a:fld>
             <a:endParaRPr lang="en-US"/>
           </a:p>
@@ -2228,7 +2228,7 @@
             <a:fld id="{1D8BD707-D9CF-40AE-B4C6-C98DA3205C09}" type="datetimeFigureOut">
               <a:rPr lang="en-US" smtClean="0"/>
               <a:pPr/>
-              <a:t>4/5/2014</a:t>
+              <a:t>4/17/2014</a:t>
             </a:fld>
             <a:endParaRPr lang="en-US"/>
           </a:p>
@@ -2478,7 +2478,7 @@
             <a:fld id="{1D8BD707-D9CF-40AE-B4C6-C98DA3205C09}" type="datetimeFigureOut">
               <a:rPr lang="en-US" smtClean="0"/>
               <a:pPr/>
-              <a:t>4/5/2014</a:t>
+              <a:t>4/17/2014</a:t>
             </a:fld>
             <a:endParaRPr lang="en-US"/>
           </a:p>
@@ -2688,7 +2688,7 @@
             <a:fld id="{1D8BD707-D9CF-40AE-B4C6-C98DA3205C09}" type="datetimeFigureOut">
               <a:rPr lang="en-US" smtClean="0"/>
               <a:pPr/>
-              <a:t>4/5/2014</a:t>
+              <a:t>4/17/2014</a:t>
             </a:fld>
             <a:endParaRPr lang="en-US"/>
           </a:p>
@@ -3601,8 +3601,8 @@
           </a:p>
         </p:txBody>
       </p:sp>
-      <mc:AlternateContent xmlns:mc="http://schemas.openxmlformats.org/markup-compatibility/2006">
-        <mc:Choice xmlns:a14="http://schemas.microsoft.com/office/drawing/2010/main" Requires="a14">
+      <mc:AlternateContent xmlns:mc="http://schemas.openxmlformats.org/markup-compatibility/2006" xmlns:a14="http://schemas.microsoft.com/office/drawing/2010/main">
+        <mc:Choice Requires="a14">
           <p:sp>
             <p:nvSpPr>
               <p:cNvPr id="6" name="TextBox 5"/>
@@ -3644,7 +3644,7 @@
             </p:txBody>
           </p:sp>
         </mc:Choice>
-        <mc:Fallback>
+        <mc:Fallback xmlns="">
           <p:sp>
             <p:nvSpPr>
               <p:cNvPr id="6" name="TextBox 5"/>
@@ -3683,8 +3683,8 @@
           </p:sp>
         </mc:Fallback>
       </mc:AlternateContent>
-      <mc:AlternateContent xmlns:mc="http://schemas.openxmlformats.org/markup-compatibility/2006">
-        <mc:Choice xmlns:a14="http://schemas.microsoft.com/office/drawing/2010/main" Requires="a14">
+      <mc:AlternateContent xmlns:mc="http://schemas.openxmlformats.org/markup-compatibility/2006" xmlns:a14="http://schemas.microsoft.com/office/drawing/2010/main">
+        <mc:Choice Requires="a14">
           <p:sp>
             <p:nvSpPr>
               <p:cNvPr id="20" name="TextBox 19"/>
@@ -3726,7 +3726,7 @@
             </p:txBody>
           </p:sp>
         </mc:Choice>
-        <mc:Fallback>
+        <mc:Fallback xmlns="">
           <p:sp>
             <p:nvSpPr>
               <p:cNvPr id="20" name="TextBox 19"/>
@@ -3765,8 +3765,8 @@
           </p:sp>
         </mc:Fallback>
       </mc:AlternateContent>
-      <mc:AlternateContent xmlns:mc="http://schemas.openxmlformats.org/markup-compatibility/2006">
-        <mc:Choice xmlns:a14="http://schemas.microsoft.com/office/drawing/2010/main" Requires="a14">
+      <mc:AlternateContent xmlns:mc="http://schemas.openxmlformats.org/markup-compatibility/2006" xmlns:a14="http://schemas.microsoft.com/office/drawing/2010/main">
+        <mc:Choice Requires="a14">
           <p:sp>
             <p:nvSpPr>
               <p:cNvPr id="21" name="TextBox 20"/>
@@ -3808,7 +3808,7 @@
             </p:txBody>
           </p:sp>
         </mc:Choice>
-        <mc:Fallback>
+        <mc:Fallback xmlns="">
           <p:sp>
             <p:nvSpPr>
               <p:cNvPr id="21" name="TextBox 20"/>
@@ -3847,8 +3847,8 @@
           </p:sp>
         </mc:Fallback>
       </mc:AlternateContent>
-      <mc:AlternateContent xmlns:mc="http://schemas.openxmlformats.org/markup-compatibility/2006">
-        <mc:Choice xmlns:a14="http://schemas.microsoft.com/office/drawing/2010/main" Requires="a14">
+      <mc:AlternateContent xmlns:mc="http://schemas.openxmlformats.org/markup-compatibility/2006" xmlns:a14="http://schemas.microsoft.com/office/drawing/2010/main">
+        <mc:Choice Requires="a14">
           <p:sp>
             <p:nvSpPr>
               <p:cNvPr id="7" name="TextBox 6"/>
@@ -3988,7 +3988,7 @@
             </p:txBody>
           </p:sp>
         </mc:Choice>
-        <mc:Fallback>
+        <mc:Fallback xmlns="">
           <p:sp>
             <p:nvSpPr>
               <p:cNvPr id="7" name="TextBox 6"/>
@@ -4171,8 +4171,8 @@
           </a:fontRef>
         </p:style>
       </p:cxnSp>
-      <mc:AlternateContent xmlns:mc="http://schemas.openxmlformats.org/markup-compatibility/2006">
-        <mc:Choice xmlns:a14="http://schemas.microsoft.com/office/drawing/2010/main" Requires="a14">
+      <mc:AlternateContent xmlns:mc="http://schemas.openxmlformats.org/markup-compatibility/2006" xmlns:a14="http://schemas.microsoft.com/office/drawing/2010/main">
+        <mc:Choice Requires="a14">
           <p:sp>
             <p:nvSpPr>
               <p:cNvPr id="22" name="TextBox 21"/>
@@ -4214,7 +4214,7 @@
             </p:txBody>
           </p:sp>
         </mc:Choice>
-        <mc:Fallback>
+        <mc:Fallback xmlns="">
           <p:sp>
             <p:nvSpPr>
               <p:cNvPr id="22" name="TextBox 21"/>
@@ -4541,8 +4541,8 @@
           </a:fontRef>
         </p:style>
       </p:cxnSp>
-      <mc:AlternateContent xmlns:mc="http://schemas.openxmlformats.org/markup-compatibility/2006">
-        <mc:Choice xmlns:a14="http://schemas.microsoft.com/office/drawing/2010/main" Requires="a14">
+      <mc:AlternateContent xmlns:mc="http://schemas.openxmlformats.org/markup-compatibility/2006" xmlns:a14="http://schemas.microsoft.com/office/drawing/2010/main">
+        <mc:Choice Requires="a14">
           <p:sp>
             <p:nvSpPr>
               <p:cNvPr id="23" name="TextBox 22"/>
@@ -4584,7 +4584,7 @@
             </p:txBody>
           </p:sp>
         </mc:Choice>
-        <mc:Fallback>
+        <mc:Fallback xmlns="">
           <p:sp>
             <p:nvSpPr>
               <p:cNvPr id="23" name="TextBox 22"/>
@@ -4623,8 +4623,8 @@
           </p:sp>
         </mc:Fallback>
       </mc:AlternateContent>
-      <mc:AlternateContent xmlns:mc="http://schemas.openxmlformats.org/markup-compatibility/2006">
-        <mc:Choice xmlns:a14="http://schemas.microsoft.com/office/drawing/2010/main" Requires="a14">
+      <mc:AlternateContent xmlns:mc="http://schemas.openxmlformats.org/markup-compatibility/2006" xmlns:a14="http://schemas.microsoft.com/office/drawing/2010/main">
+        <mc:Choice Requires="a14">
           <p:sp>
             <p:nvSpPr>
               <p:cNvPr id="24" name="TextBox 23"/>
@@ -4666,7 +4666,7 @@
             </p:txBody>
           </p:sp>
         </mc:Choice>
-        <mc:Fallback>
+        <mc:Fallback xmlns="">
           <p:sp>
             <p:nvSpPr>
               <p:cNvPr id="24" name="TextBox 23"/>

</xml_diff>